<commit_message>
Changed CLSM to MPM
</commit_message>
<xml_diff>
--- a/7 Thesis/images/Presentation1.pptx
+++ b/7 Thesis/images/Presentation1.pptx
@@ -5,13 +5,14 @@
     <p:sldMasterId id="2147483648" r:id="rId1"/>
   </p:sldMasterIdLst>
   <p:notesMasterIdLst>
-    <p:notesMasterId r:id="rId6"/>
+    <p:notesMasterId r:id="rId7"/>
   </p:notesMasterIdLst>
   <p:sldIdLst>
     <p:sldId id="257" r:id="rId2"/>
     <p:sldId id="260" r:id="rId3"/>
     <p:sldId id="258" r:id="rId4"/>
     <p:sldId id="259" r:id="rId5"/>
+    <p:sldId id="261" r:id="rId6"/>
   </p:sldIdLst>
   <p:sldSz cx="12192000" cy="6858000"/>
   <p:notesSz cx="6858000" cy="9144000"/>
@@ -121,7 +122,7 @@
 <file path=ppt/revisionInfo.xml><?xml version="1.0" encoding="utf-8"?>
 <p1510:revInfo xmlns:a="http://schemas.openxmlformats.org/drawingml/2006/main" xmlns:r="http://schemas.openxmlformats.org/officeDocument/2006/relationships" xmlns:p1510="http://schemas.microsoft.com/office/powerpoint/2015/10/main">
   <p1510:revLst>
-    <p1510:client id="{FF6F5C0C-CD3F-EA45-A737-DB4389012D45}" v="20" dt="2021-12-15T22:04:26.498"/>
+    <p1510:client id="{FF6F5C0C-CD3F-EA45-A737-DB4389012D45}" v="28" dt="2022-01-16T14:55:21.833"/>
   </p1510:revLst>
 </p1510:revInfo>
 </file>
@@ -131,7 +132,7 @@
   <pc:docChgLst>
     <pc:chgData name="Sergey Dobrovolsky" userId="73d305bacc4c2cf3" providerId="LiveId" clId="{FF6F5C0C-CD3F-EA45-A737-DB4389012D45}"/>
     <pc:docChg chg="undo custSel addSld delSld modSld">
-      <pc:chgData name="Sergey Dobrovolsky" userId="73d305bacc4c2cf3" providerId="LiveId" clId="{FF6F5C0C-CD3F-EA45-A737-DB4389012D45}" dt="2021-12-15T22:04:38.227" v="382" actId="1076"/>
+      <pc:chgData name="Sergey Dobrovolsky" userId="73d305bacc4c2cf3" providerId="LiveId" clId="{FF6F5C0C-CD3F-EA45-A737-DB4389012D45}" dt="2022-01-16T14:55:42.798" v="434" actId="1076"/>
       <pc:docMkLst>
         <pc:docMk/>
       </pc:docMkLst>
@@ -426,6 +427,77 @@
           </ac:picMkLst>
         </pc:picChg>
       </pc:sldChg>
+      <pc:sldChg chg="addSp delSp modSp new mod">
+        <pc:chgData name="Sergey Dobrovolsky" userId="73d305bacc4c2cf3" providerId="LiveId" clId="{FF6F5C0C-CD3F-EA45-A737-DB4389012D45}" dt="2022-01-16T14:55:42.798" v="434" actId="1076"/>
+        <pc:sldMkLst>
+          <pc:docMk/>
+          <pc:sldMk cId="3511354191" sldId="261"/>
+        </pc:sldMkLst>
+        <pc:spChg chg="add mod">
+          <ac:chgData name="Sergey Dobrovolsky" userId="73d305bacc4c2cf3" providerId="LiveId" clId="{FF6F5C0C-CD3F-EA45-A737-DB4389012D45}" dt="2022-01-16T14:54:40.187" v="414" actId="1076"/>
+          <ac:spMkLst>
+            <pc:docMk/>
+            <pc:sldMk cId="3511354191" sldId="261"/>
+            <ac:spMk id="6" creationId="{69CCF2F3-1A69-1247-B809-51493F8D8F51}"/>
+          </ac:spMkLst>
+        </pc:spChg>
+        <pc:spChg chg="add mod">
+          <ac:chgData name="Sergey Dobrovolsky" userId="73d305bacc4c2cf3" providerId="LiveId" clId="{FF6F5C0C-CD3F-EA45-A737-DB4389012D45}" dt="2022-01-16T14:54:40.187" v="414" actId="1076"/>
+          <ac:spMkLst>
+            <pc:docMk/>
+            <pc:sldMk cId="3511354191" sldId="261"/>
+            <ac:spMk id="7" creationId="{AFF7B4DA-D204-E34D-8815-151775DF689B}"/>
+          </ac:spMkLst>
+        </pc:spChg>
+        <pc:spChg chg="add mod">
+          <ac:chgData name="Sergey Dobrovolsky" userId="73d305bacc4c2cf3" providerId="LiveId" clId="{FF6F5C0C-CD3F-EA45-A737-DB4389012D45}" dt="2022-01-16T14:55:42.798" v="434" actId="1076"/>
+          <ac:spMkLst>
+            <pc:docMk/>
+            <pc:sldMk cId="3511354191" sldId="261"/>
+            <ac:spMk id="8" creationId="{2476B432-C018-F341-93F5-A3459B7B2778}"/>
+          </ac:spMkLst>
+        </pc:spChg>
+        <pc:spChg chg="add mod">
+          <ac:chgData name="Sergey Dobrovolsky" userId="73d305bacc4c2cf3" providerId="LiveId" clId="{FF6F5C0C-CD3F-EA45-A737-DB4389012D45}" dt="2022-01-16T14:55:39.926" v="433" actId="1076"/>
+          <ac:spMkLst>
+            <pc:docMk/>
+            <pc:sldMk cId="3511354191" sldId="261"/>
+            <ac:spMk id="9" creationId="{5E47097A-E957-3144-A0F6-9652C7CDA0F6}"/>
+          </ac:spMkLst>
+        </pc:spChg>
+        <pc:picChg chg="add mod">
+          <ac:chgData name="Sergey Dobrovolsky" userId="73d305bacc4c2cf3" providerId="LiveId" clId="{FF6F5C0C-CD3F-EA45-A737-DB4389012D45}" dt="2022-01-16T14:54:40.187" v="414" actId="1076"/>
+          <ac:picMkLst>
+            <pc:docMk/>
+            <pc:sldMk cId="3511354191" sldId="261"/>
+            <ac:picMk id="2" creationId="{8D8641CF-4E09-4744-930B-AAA7908925BE}"/>
+          </ac:picMkLst>
+        </pc:picChg>
+        <pc:picChg chg="add del mod">
+          <ac:chgData name="Sergey Dobrovolsky" userId="73d305bacc4c2cf3" providerId="LiveId" clId="{FF6F5C0C-CD3F-EA45-A737-DB4389012D45}" dt="2022-01-16T14:53:34.683" v="395" actId="478"/>
+          <ac:picMkLst>
+            <pc:docMk/>
+            <pc:sldMk cId="3511354191" sldId="261"/>
+            <ac:picMk id="3" creationId="{B45CF7B7-A104-2744-B6A1-C5540A841BAF}"/>
+          </ac:picMkLst>
+        </pc:picChg>
+        <pc:picChg chg="add mod modCrop">
+          <ac:chgData name="Sergey Dobrovolsky" userId="73d305bacc4c2cf3" providerId="LiveId" clId="{FF6F5C0C-CD3F-EA45-A737-DB4389012D45}" dt="2022-01-16T14:55:08.499" v="415" actId="732"/>
+          <ac:picMkLst>
+            <pc:docMk/>
+            <pc:sldMk cId="3511354191" sldId="261"/>
+            <ac:picMk id="4" creationId="{A3861BCF-092D-A847-B3A9-613D6BCCE987}"/>
+          </ac:picMkLst>
+        </pc:picChg>
+        <pc:picChg chg="add del mod">
+          <ac:chgData name="Sergey Dobrovolsky" userId="73d305bacc4c2cf3" providerId="LiveId" clId="{FF6F5C0C-CD3F-EA45-A737-DB4389012D45}" dt="2022-01-16T14:54:37.143" v="413" actId="478"/>
+          <ac:picMkLst>
+            <pc:docMk/>
+            <pc:sldMk cId="3511354191" sldId="261"/>
+            <ac:picMk id="5" creationId="{03DB004C-7062-BA49-8E2A-1034567A753E}"/>
+          </ac:picMkLst>
+        </pc:picChg>
+      </pc:sldChg>
     </pc:docChg>
   </pc:docChgLst>
 </pc:chgInfo>
@@ -513,7 +585,7 @@
           <a:p>
             <a:fld id="{6216EA6A-9DAB-9A42-8E7C-9B1E61E75C22}" type="datetimeFigureOut">
               <a:rPr lang="en-DE" smtClean="0"/>
-              <a:t>15.12.21</a:t>
+              <a:t>16.01.22</a:t>
             </a:fld>
             <a:endParaRPr lang="en-DE"/>
           </a:p>
@@ -1014,7 +1086,7 @@
           <a:p>
             <a:fld id="{0FDC7A45-3FBB-C14A-8E7C-08C84AB72CD9}" type="datetimeFigureOut">
               <a:rPr lang="en-DE" smtClean="0"/>
-              <a:t>15.12.21</a:t>
+              <a:t>16.01.22</a:t>
             </a:fld>
             <a:endParaRPr lang="en-DE"/>
           </a:p>
@@ -1214,7 +1286,7 @@
           <a:p>
             <a:fld id="{0FDC7A45-3FBB-C14A-8E7C-08C84AB72CD9}" type="datetimeFigureOut">
               <a:rPr lang="en-DE" smtClean="0"/>
-              <a:t>15.12.21</a:t>
+              <a:t>16.01.22</a:t>
             </a:fld>
             <a:endParaRPr lang="en-DE"/>
           </a:p>
@@ -1424,7 +1496,7 @@
           <a:p>
             <a:fld id="{0FDC7A45-3FBB-C14A-8E7C-08C84AB72CD9}" type="datetimeFigureOut">
               <a:rPr lang="en-DE" smtClean="0"/>
-              <a:t>15.12.21</a:t>
+              <a:t>16.01.22</a:t>
             </a:fld>
             <a:endParaRPr lang="en-DE"/>
           </a:p>
@@ -1624,7 +1696,7 @@
           <a:p>
             <a:fld id="{0FDC7A45-3FBB-C14A-8E7C-08C84AB72CD9}" type="datetimeFigureOut">
               <a:rPr lang="en-DE" smtClean="0"/>
-              <a:t>15.12.21</a:t>
+              <a:t>16.01.22</a:t>
             </a:fld>
             <a:endParaRPr lang="en-DE"/>
           </a:p>
@@ -1900,7 +1972,7 @@
           <a:p>
             <a:fld id="{0FDC7A45-3FBB-C14A-8E7C-08C84AB72CD9}" type="datetimeFigureOut">
               <a:rPr lang="en-DE" smtClean="0"/>
-              <a:t>15.12.21</a:t>
+              <a:t>16.01.22</a:t>
             </a:fld>
             <a:endParaRPr lang="en-DE"/>
           </a:p>
@@ -2168,7 +2240,7 @@
           <a:p>
             <a:fld id="{0FDC7A45-3FBB-C14A-8E7C-08C84AB72CD9}" type="datetimeFigureOut">
               <a:rPr lang="en-DE" smtClean="0"/>
-              <a:t>15.12.21</a:t>
+              <a:t>16.01.22</a:t>
             </a:fld>
             <a:endParaRPr lang="en-DE"/>
           </a:p>
@@ -2583,7 +2655,7 @@
           <a:p>
             <a:fld id="{0FDC7A45-3FBB-C14A-8E7C-08C84AB72CD9}" type="datetimeFigureOut">
               <a:rPr lang="en-DE" smtClean="0"/>
-              <a:t>15.12.21</a:t>
+              <a:t>16.01.22</a:t>
             </a:fld>
             <a:endParaRPr lang="en-DE"/>
           </a:p>
@@ -2725,7 +2797,7 @@
           <a:p>
             <a:fld id="{0FDC7A45-3FBB-C14A-8E7C-08C84AB72CD9}" type="datetimeFigureOut">
               <a:rPr lang="en-DE" smtClean="0"/>
-              <a:t>15.12.21</a:t>
+              <a:t>16.01.22</a:t>
             </a:fld>
             <a:endParaRPr lang="en-DE"/>
           </a:p>
@@ -2838,7 +2910,7 @@
           <a:p>
             <a:fld id="{0FDC7A45-3FBB-C14A-8E7C-08C84AB72CD9}" type="datetimeFigureOut">
               <a:rPr lang="en-DE" smtClean="0"/>
-              <a:t>15.12.21</a:t>
+              <a:t>16.01.22</a:t>
             </a:fld>
             <a:endParaRPr lang="en-DE"/>
           </a:p>
@@ -3151,7 +3223,7 @@
           <a:p>
             <a:fld id="{0FDC7A45-3FBB-C14A-8E7C-08C84AB72CD9}" type="datetimeFigureOut">
               <a:rPr lang="en-DE" smtClean="0"/>
-              <a:t>15.12.21</a:t>
+              <a:t>16.01.22</a:t>
             </a:fld>
             <a:endParaRPr lang="en-DE"/>
           </a:p>
@@ -3440,7 +3512,7 @@
           <a:p>
             <a:fld id="{0FDC7A45-3FBB-C14A-8E7C-08C84AB72CD9}" type="datetimeFigureOut">
               <a:rPr lang="en-DE" smtClean="0"/>
-              <a:t>15.12.21</a:t>
+              <a:t>16.01.22</a:t>
             </a:fld>
             <a:endParaRPr lang="en-DE"/>
           </a:p>
@@ -3683,7 +3755,7 @@
           <a:p>
             <a:fld id="{0FDC7A45-3FBB-C14A-8E7C-08C84AB72CD9}" type="datetimeFigureOut">
               <a:rPr lang="en-DE" smtClean="0"/>
-              <a:t>15.12.21</a:t>
+              <a:t>16.01.22</a:t>
             </a:fld>
             <a:endParaRPr lang="en-DE"/>
           </a:p>
@@ -5258,6 +5330,235 @@
     <p:extLst>
       <p:ext uri="{BB962C8B-B14F-4D97-AF65-F5344CB8AC3E}">
         <p14:creationId xmlns:p14="http://schemas.microsoft.com/office/powerpoint/2010/main" val="3678857559"/>
+      </p:ext>
+    </p:extLst>
+  </p:cSld>
+  <p:clrMapOvr>
+    <a:masterClrMapping/>
+  </p:clrMapOvr>
+</p:sld>
+</file>
+
+<file path=ppt/slides/slide5.xml><?xml version="1.0" encoding="utf-8"?>
+<p:sld xmlns:a="http://schemas.openxmlformats.org/drawingml/2006/main" xmlns:r="http://schemas.openxmlformats.org/officeDocument/2006/relationships" xmlns:p="http://schemas.openxmlformats.org/presentationml/2006/main">
+  <p:cSld>
+    <p:spTree>
+      <p:nvGrpSpPr>
+        <p:cNvPr id="1" name=""/>
+        <p:cNvGrpSpPr/>
+        <p:nvPr/>
+      </p:nvGrpSpPr>
+      <p:grpSpPr>
+        <a:xfrm>
+          <a:off x="0" y="0"/>
+          <a:ext cx="0" cy="0"/>
+          <a:chOff x="0" y="0"/>
+          <a:chExt cx="0" cy="0"/>
+        </a:xfrm>
+      </p:grpSpPr>
+      <p:pic>
+        <p:nvPicPr>
+          <p:cNvPr id="2" name="Picture 1">
+            <a:extLst>
+              <a:ext uri="{FF2B5EF4-FFF2-40B4-BE49-F238E27FC236}">
+                <a16:creationId xmlns:a16="http://schemas.microsoft.com/office/drawing/2014/main" id="{8D8641CF-4E09-4744-930B-AAA7908925BE}"/>
+              </a:ext>
+            </a:extLst>
+          </p:cNvPr>
+          <p:cNvPicPr>
+            <a:picLocks noChangeAspect="1"/>
+          </p:cNvPicPr>
+          <p:nvPr/>
+        </p:nvPicPr>
+        <p:blipFill>
+          <a:blip r:embed="rId2"/>
+          <a:stretch>
+            <a:fillRect/>
+          </a:stretch>
+        </p:blipFill>
+        <p:spPr>
+          <a:xfrm>
+            <a:off x="2641600" y="2164827"/>
+            <a:ext cx="3454400" cy="2346925"/>
+          </a:xfrm>
+          <a:prstGeom prst="rect">
+            <a:avLst/>
+          </a:prstGeom>
+        </p:spPr>
+      </p:pic>
+      <p:pic>
+        <p:nvPicPr>
+          <p:cNvPr id="4" name="Picture 3">
+            <a:extLst>
+              <a:ext uri="{FF2B5EF4-FFF2-40B4-BE49-F238E27FC236}">
+                <a16:creationId xmlns:a16="http://schemas.microsoft.com/office/drawing/2014/main" id="{A3861BCF-092D-A847-B3A9-613D6BCCE987}"/>
+              </a:ext>
+            </a:extLst>
+          </p:cNvPr>
+          <p:cNvPicPr>
+            <a:picLocks noChangeAspect="1"/>
+          </p:cNvPicPr>
+          <p:nvPr/>
+        </p:nvPicPr>
+        <p:blipFill rotWithShape="1">
+          <a:blip r:embed="rId3"/>
+          <a:srcRect b="21759"/>
+          <a:stretch/>
+        </p:blipFill>
+        <p:spPr>
+          <a:xfrm>
+            <a:off x="6096000" y="2070976"/>
+            <a:ext cx="3454400" cy="2086687"/>
+          </a:xfrm>
+          <a:prstGeom prst="rect">
+            <a:avLst/>
+          </a:prstGeom>
+        </p:spPr>
+      </p:pic>
+      <p:sp>
+        <p:nvSpPr>
+          <p:cNvPr id="6" name="TextBox 5">
+            <a:extLst>
+              <a:ext uri="{FF2B5EF4-FFF2-40B4-BE49-F238E27FC236}">
+                <a16:creationId xmlns:a16="http://schemas.microsoft.com/office/drawing/2014/main" id="{69CCF2F3-1A69-1247-B809-51493F8D8F51}"/>
+              </a:ext>
+            </a:extLst>
+          </p:cNvPr>
+          <p:cNvSpPr txBox="1"/>
+          <p:nvPr/>
+        </p:nvSpPr>
+        <p:spPr>
+          <a:xfrm>
+            <a:off x="2323884" y="1701644"/>
+            <a:ext cx="317716" cy="369332"/>
+          </a:xfrm>
+          <a:prstGeom prst="rect">
+            <a:avLst/>
+          </a:prstGeom>
+          <a:noFill/>
+        </p:spPr>
+        <p:txBody>
+          <a:bodyPr wrap="none" rtlCol="0">
+            <a:spAutoFit/>
+          </a:bodyPr>
+          <a:lstStyle/>
+          <a:p>
+            <a:r>
+              <a:rPr lang="en-DE" dirty="0"/>
+              <a:t>A</a:t>
+            </a:r>
+          </a:p>
+        </p:txBody>
+      </p:sp>
+      <p:sp>
+        <p:nvSpPr>
+          <p:cNvPr id="7" name="TextBox 6">
+            <a:extLst>
+              <a:ext uri="{FF2B5EF4-FFF2-40B4-BE49-F238E27FC236}">
+                <a16:creationId xmlns:a16="http://schemas.microsoft.com/office/drawing/2014/main" id="{AFF7B4DA-D204-E34D-8815-151775DF689B}"/>
+              </a:ext>
+            </a:extLst>
+          </p:cNvPr>
+          <p:cNvSpPr txBox="1"/>
+          <p:nvPr/>
+        </p:nvSpPr>
+        <p:spPr>
+          <a:xfrm>
+            <a:off x="6096000" y="1701644"/>
+            <a:ext cx="309700" cy="369332"/>
+          </a:xfrm>
+          <a:prstGeom prst="rect">
+            <a:avLst/>
+          </a:prstGeom>
+          <a:noFill/>
+        </p:spPr>
+        <p:txBody>
+          <a:bodyPr wrap="none" rtlCol="0">
+            <a:spAutoFit/>
+          </a:bodyPr>
+          <a:lstStyle/>
+          <a:p>
+            <a:r>
+              <a:rPr lang="en-DE" dirty="0"/>
+              <a:t>B</a:t>
+            </a:r>
+          </a:p>
+        </p:txBody>
+      </p:sp>
+      <p:sp>
+        <p:nvSpPr>
+          <p:cNvPr id="8" name="TextBox 7">
+            <a:extLst>
+              <a:ext uri="{FF2B5EF4-FFF2-40B4-BE49-F238E27FC236}">
+                <a16:creationId xmlns:a16="http://schemas.microsoft.com/office/drawing/2014/main" id="{2476B432-C018-F341-93F5-A3459B7B2778}"/>
+              </a:ext>
+            </a:extLst>
+          </p:cNvPr>
+          <p:cNvSpPr txBox="1"/>
+          <p:nvPr/>
+        </p:nvSpPr>
+        <p:spPr>
+          <a:xfrm>
+            <a:off x="6842566" y="4157663"/>
+            <a:ext cx="585417" cy="369332"/>
+          </a:xfrm>
+          <a:prstGeom prst="rect">
+            <a:avLst/>
+          </a:prstGeom>
+          <a:noFill/>
+        </p:spPr>
+        <p:txBody>
+          <a:bodyPr wrap="none" rtlCol="0">
+            <a:spAutoFit/>
+          </a:bodyPr>
+          <a:lstStyle/>
+          <a:p>
+            <a:r>
+              <a:rPr lang="en-DE" dirty="0"/>
+              <a:t>1 PE</a:t>
+            </a:r>
+          </a:p>
+        </p:txBody>
+      </p:sp>
+      <p:sp>
+        <p:nvSpPr>
+          <p:cNvPr id="9" name="TextBox 8">
+            <a:extLst>
+              <a:ext uri="{FF2B5EF4-FFF2-40B4-BE49-F238E27FC236}">
+                <a16:creationId xmlns:a16="http://schemas.microsoft.com/office/drawing/2014/main" id="{5E47097A-E957-3144-A0F6-9652C7CDA0F6}"/>
+              </a:ext>
+            </a:extLst>
+          </p:cNvPr>
+          <p:cNvSpPr txBox="1"/>
+          <p:nvPr/>
+        </p:nvSpPr>
+        <p:spPr>
+          <a:xfrm>
+            <a:off x="8335609" y="4157663"/>
+            <a:ext cx="532518" cy="369332"/>
+          </a:xfrm>
+          <a:prstGeom prst="rect">
+            <a:avLst/>
+          </a:prstGeom>
+          <a:noFill/>
+        </p:spPr>
+        <p:txBody>
+          <a:bodyPr wrap="none" rtlCol="0">
+            <a:spAutoFit/>
+          </a:bodyPr>
+          <a:lstStyle/>
+          <a:p>
+            <a:r>
+              <a:rPr lang="en-DE" dirty="0"/>
+              <a:t>2PE</a:t>
+            </a:r>
+          </a:p>
+        </p:txBody>
+      </p:sp>
+    </p:spTree>
+    <p:extLst>
+      <p:ext uri="{BB962C8B-B14F-4D97-AF65-F5344CB8AC3E}">
+        <p14:creationId xmlns:p14="http://schemas.microsoft.com/office/powerpoint/2010/main" val="3511354191"/>
       </p:ext>
     </p:extLst>
   </p:cSld>

</xml_diff>